<commit_message>
Farben zu Autos hinzugefügt
</commit_message>
<xml_diff>
--- a/Praesentation Datenbanken II.pptx
+++ b/Praesentation Datenbanken II.pptx
@@ -280,7 +280,7 @@
           <a:p>
             <a:fld id="{1B3F7136-9867-4768-B3E2-4C7E3C76D492}" type="datetimeFigureOut">
               <a:rPr lang="de-DE" smtClean="0"/>
-              <a:t>29.05.2012</a:t>
+              <a:t>30.05.2012</a:t>
             </a:fld>
             <a:endParaRPr lang="de-DE"/>
           </a:p>
@@ -3389,7 +3389,7 @@
           <a:p>
             <a:fld id="{B7D07FFA-516B-4FA5-AF3F-60C3F91DD746}" type="datetimeFigureOut">
               <a:rPr lang="de-DE" smtClean="0"/>
-              <a:t>29.05.2012</a:t>
+              <a:t>30.05.2012</a:t>
             </a:fld>
             <a:endParaRPr lang="de-DE"/>
           </a:p>
@@ -3674,7 +3674,7 @@
           <a:p>
             <a:fld id="{B7D07FFA-516B-4FA5-AF3F-60C3F91DD746}" type="datetimeFigureOut">
               <a:rPr lang="de-DE" smtClean="0"/>
-              <a:t>29.05.2012</a:t>
+              <a:t>30.05.2012</a:t>
             </a:fld>
             <a:endParaRPr lang="de-DE"/>
           </a:p>
@@ -3849,7 +3849,7 @@
           <a:p>
             <a:fld id="{B7D07FFA-516B-4FA5-AF3F-60C3F91DD746}" type="datetimeFigureOut">
               <a:rPr lang="de-DE" smtClean="0"/>
-              <a:t>29.05.2012</a:t>
+              <a:t>30.05.2012</a:t>
             </a:fld>
             <a:endParaRPr lang="de-DE"/>
           </a:p>
@@ -4092,7 +4092,7 @@
           <a:p>
             <a:fld id="{B7D07FFA-516B-4FA5-AF3F-60C3F91DD746}" type="datetimeFigureOut">
               <a:rPr lang="de-DE" smtClean="0"/>
-              <a:t>29.05.2012</a:t>
+              <a:t>30.05.2012</a:t>
             </a:fld>
             <a:endParaRPr lang="de-DE"/>
           </a:p>
@@ -4294,7 +4294,7 @@
           <a:p>
             <a:fld id="{B7D07FFA-516B-4FA5-AF3F-60C3F91DD746}" type="datetimeFigureOut">
               <a:rPr lang="de-DE" smtClean="0"/>
-              <a:t>29.05.2012</a:t>
+              <a:t>30.05.2012</a:t>
             </a:fld>
             <a:endParaRPr lang="de-DE"/>
           </a:p>
@@ -4537,7 +4537,7 @@
           <a:p>
             <a:fld id="{B7D07FFA-516B-4FA5-AF3F-60C3F91DD746}" type="datetimeFigureOut">
               <a:rPr lang="de-DE" smtClean="0"/>
-              <a:t>29.05.2012</a:t>
+              <a:t>30.05.2012</a:t>
             </a:fld>
             <a:endParaRPr lang="de-DE"/>
           </a:p>
@@ -4847,7 +4847,7 @@
           <a:p>
             <a:fld id="{B7D07FFA-516B-4FA5-AF3F-60C3F91DD746}" type="datetimeFigureOut">
               <a:rPr lang="de-DE" smtClean="0"/>
-              <a:t>29.05.2012</a:t>
+              <a:t>30.05.2012</a:t>
             </a:fld>
             <a:endParaRPr lang="de-DE"/>
           </a:p>
@@ -5290,7 +5290,7 @@
           <a:p>
             <a:fld id="{B7D07FFA-516B-4FA5-AF3F-60C3F91DD746}" type="datetimeFigureOut">
               <a:rPr lang="de-DE" smtClean="0"/>
-              <a:t>29.05.2012</a:t>
+              <a:t>30.05.2012</a:t>
             </a:fld>
             <a:endParaRPr lang="de-DE"/>
           </a:p>
@@ -5403,7 +5403,7 @@
           <a:p>
             <a:fld id="{B7D07FFA-516B-4FA5-AF3F-60C3F91DD746}" type="datetimeFigureOut">
               <a:rPr lang="de-DE" smtClean="0"/>
-              <a:t>29.05.2012</a:t>
+              <a:t>30.05.2012</a:t>
             </a:fld>
             <a:endParaRPr lang="de-DE"/>
           </a:p>
@@ -5493,7 +5493,7 @@
           <a:p>
             <a:fld id="{B7D07FFA-516B-4FA5-AF3F-60C3F91DD746}" type="datetimeFigureOut">
               <a:rPr lang="de-DE" smtClean="0"/>
-              <a:t>29.05.2012</a:t>
+              <a:t>30.05.2012</a:t>
             </a:fld>
             <a:endParaRPr lang="de-DE"/>
           </a:p>
@@ -5778,7 +5778,7 @@
           <a:p>
             <a:fld id="{B7D07FFA-516B-4FA5-AF3F-60C3F91DD746}" type="datetimeFigureOut">
               <a:rPr lang="de-DE" smtClean="0"/>
-              <a:t>29.05.2012</a:t>
+              <a:t>30.05.2012</a:t>
             </a:fld>
             <a:endParaRPr lang="de-DE"/>
           </a:p>
@@ -5943,7 +5943,7 @@
           <a:p>
             <a:fld id="{B7D07FFA-516B-4FA5-AF3F-60C3F91DD746}" type="datetimeFigureOut">
               <a:rPr lang="de-DE" smtClean="0"/>
-              <a:t>29.05.2012</a:t>
+              <a:t>30.05.2012</a:t>
             </a:fld>
             <a:endParaRPr lang="de-DE"/>
           </a:p>
@@ -6134,7 +6134,7 @@
           <a:p>
             <a:fld id="{B7D07FFA-516B-4FA5-AF3F-60C3F91DD746}" type="datetimeFigureOut">
               <a:rPr lang="de-DE" smtClean="0"/>
-              <a:t>29.05.2012</a:t>
+              <a:t>30.05.2012</a:t>
             </a:fld>
             <a:endParaRPr lang="de-DE"/>
           </a:p>
@@ -6790,7 +6790,7 @@
           <a:p>
             <a:fld id="{B7D07FFA-516B-4FA5-AF3F-60C3F91DD746}" type="datetimeFigureOut">
               <a:rPr lang="de-DE" smtClean="0"/>
-              <a:t>29.05.2012</a:t>
+              <a:t>30.05.2012</a:t>
             </a:fld>
             <a:endParaRPr lang="de-DE"/>
           </a:p>
@@ -6965,7 +6965,7 @@
           <a:p>
             <a:fld id="{B7D07FFA-516B-4FA5-AF3F-60C3F91DD746}" type="datetimeFigureOut">
               <a:rPr lang="de-DE" smtClean="0"/>
-              <a:t>29.05.2012</a:t>
+              <a:t>30.05.2012</a:t>
             </a:fld>
             <a:endParaRPr lang="de-DE"/>
           </a:p>
@@ -7206,7 +7206,7 @@
           <a:p>
             <a:fld id="{B7D07FFA-516B-4FA5-AF3F-60C3F91DD746}" type="datetimeFigureOut">
               <a:rPr lang="de-DE" smtClean="0"/>
-              <a:t>29.05.2012</a:t>
+              <a:t>30.05.2012</a:t>
             </a:fld>
             <a:endParaRPr lang="de-DE"/>
           </a:p>
@@ -7319,7 +7319,7 @@
           <a:p>
             <a:fld id="{B7D07FFA-516B-4FA5-AF3F-60C3F91DD746}" type="datetimeFigureOut">
               <a:rPr lang="de-DE" smtClean="0"/>
-              <a:t>29.05.2012</a:t>
+              <a:t>30.05.2012</a:t>
             </a:fld>
             <a:endParaRPr lang="de-DE"/>
           </a:p>
@@ -7858,7 +7858,7 @@
           <a:p>
             <a:fld id="{B7D07FFA-516B-4FA5-AF3F-60C3F91DD746}" type="datetimeFigureOut">
               <a:rPr lang="de-DE" smtClean="0"/>
-              <a:t>29.05.2012</a:t>
+              <a:t>30.05.2012</a:t>
             </a:fld>
             <a:endParaRPr lang="de-DE"/>
           </a:p>
@@ -7971,7 +7971,7 @@
           <a:p>
             <a:fld id="{B7D07FFA-516B-4FA5-AF3F-60C3F91DD746}" type="datetimeFigureOut">
               <a:rPr lang="de-DE" smtClean="0"/>
-              <a:t>29.05.2012</a:t>
+              <a:t>30.05.2012</a:t>
             </a:fld>
             <a:endParaRPr lang="de-DE"/>
           </a:p>
@@ -8061,7 +8061,7 @@
           <a:p>
             <a:fld id="{B7D07FFA-516B-4FA5-AF3F-60C3F91DD746}" type="datetimeFigureOut">
               <a:rPr lang="de-DE" smtClean="0"/>
-              <a:t>29.05.2012</a:t>
+              <a:t>30.05.2012</a:t>
             </a:fld>
             <a:endParaRPr lang="de-DE"/>
           </a:p>
@@ -10712,7 +10712,7 @@
           <a:p>
             <a:fld id="{B7D07FFA-516B-4FA5-AF3F-60C3F91DD746}" type="datetimeFigureOut">
               <a:rPr lang="de-DE" smtClean="0"/>
-              <a:t>29.05.2012</a:t>
+              <a:t>30.05.2012</a:t>
             </a:fld>
             <a:endParaRPr lang="de-DE"/>
           </a:p>
@@ -13924,7 +13924,7 @@
           <a:p>
             <a:fld id="{B7D07FFA-516B-4FA5-AF3F-60C3F91DD746}" type="datetimeFigureOut">
               <a:rPr lang="de-DE" smtClean="0"/>
-              <a:t>29.05.2012</a:t>
+              <a:t>30.05.2012</a:t>
             </a:fld>
             <a:endParaRPr lang="de-DE"/>
           </a:p>
@@ -16746,7 +16746,7 @@
           <a:p>
             <a:fld id="{B7D07FFA-516B-4FA5-AF3F-60C3F91DD746}" type="datetimeFigureOut">
               <a:rPr lang="de-DE" smtClean="0"/>
-              <a:t>29.05.2012</a:t>
+              <a:t>30.05.2012</a:t>
             </a:fld>
             <a:endParaRPr lang="de-DE"/>
           </a:p>
@@ -37145,7 +37145,7 @@
           <a:p>
             <a:fld id="{B7D07FFA-516B-4FA5-AF3F-60C3F91DD746}" type="datetimeFigureOut">
               <a:rPr lang="de-DE" smtClean="0"/>
-              <a:t>29.05.2012</a:t>
+              <a:t>30.05.2012</a:t>
             </a:fld>
             <a:endParaRPr lang="de-DE"/>
           </a:p>
@@ -37917,7 +37917,6 @@
               <a:rPr lang="de-DE" dirty="0" smtClean="0"/>
               <a:t>…</a:t>
             </a:r>
-            <a:endParaRPr lang="de-DE" dirty="0" smtClean="0"/>
           </a:p>
         </p:txBody>
       </p:sp>
@@ -39406,11 +39405,11 @@
             </a:pPr>
             <a:r>
               <a:rPr lang="de-DE" dirty="0" smtClean="0"/>
-              <a:t>≈ 1.100 Zeilen Java (+ Kommentare</a:t>
+              <a:t>≈ 1.100 Zeilen Java (+ Kommentare, Leerzeilen, </a:t>
             </a:r>
             <a:r>
-              <a:rPr lang="de-DE" smtClean="0"/>
-              <a:t>, Leerzeilen, …)</a:t>
+              <a:rPr lang="de-DE" dirty="0" smtClean="0"/>
+              <a:t>…)</a:t>
             </a:r>
             <a:endParaRPr lang="de-DE" dirty="0" smtClean="0"/>
           </a:p>
@@ -39420,7 +39419,13 @@
               <a:rPr lang="de-DE" dirty="0" smtClean="0">
                 <a:sym typeface="Wingdings" pitchFamily="2" charset="2"/>
               </a:rPr>
-              <a:t>Fehlen ja nur noch die Inhalte!</a:t>
+              <a:t>1 Tag: Anzeigen, Einfügen und </a:t>
+            </a:r>
+            <a:r>
+              <a:rPr lang="de-DE" smtClean="0">
+                <a:sym typeface="Wingdings" pitchFamily="2" charset="2"/>
+              </a:rPr>
+              <a:t>Verändern von Daten</a:t>
             </a:r>
             <a:endParaRPr lang="de-DE" dirty="0" smtClean="0"/>
           </a:p>

</xml_diff>